<commit_message>
update for adding submodules
</commit_message>
<xml_diff>
--- a/doc/Report/Oct 31 2018.pptx
+++ b/doc/Report/Oct 31 2018.pptx
@@ -232,7 +232,7 @@
           <a:p>
             <a:fld id="{97BE2177-E45B-449F-AE2E-ED4743253C6D}" type="datetimeFigureOut">
               <a:rPr lang="zh-CN" altLang="en-US" smtClean="0"/>
-              <a:t>2018/10/30</a:t>
+              <a:t>2018/10/31</a:t>
             </a:fld>
             <a:endParaRPr lang="zh-CN" altLang="en-US"/>
           </a:p>
@@ -1003,6 +1003,90 @@
 </p:notes>
 </file>
 
+<file path=ppt/notesSlides/notesSlide15.xml><?xml version="1.0" encoding="utf-8"?>
+<p:notes xmlns:a="http://schemas.openxmlformats.org/drawingml/2006/main" xmlns:r="http://schemas.openxmlformats.org/officeDocument/2006/relationships" xmlns:p="http://schemas.openxmlformats.org/presentationml/2006/main">
+  <p:cSld>
+    <p:spTree>
+      <p:nvGrpSpPr>
+        <p:cNvPr id="1" name=""/>
+        <p:cNvGrpSpPr/>
+        <p:nvPr/>
+      </p:nvGrpSpPr>
+      <p:grpSpPr>
+        <a:xfrm>
+          <a:off x="0" y="0"/>
+          <a:ext cx="0" cy="0"/>
+          <a:chOff x="0" y="0"/>
+          <a:chExt cx="0" cy="0"/>
+        </a:xfrm>
+      </p:grpSpPr>
+      <p:sp>
+        <p:nvSpPr>
+          <p:cNvPr id="2" name="幻灯片图像占位符 1"/>
+          <p:cNvSpPr>
+            <a:spLocks noGrp="1" noRot="1" noChangeAspect="1"/>
+          </p:cNvSpPr>
+          <p:nvPr>
+            <p:ph type="sldImg"/>
+          </p:nvPr>
+        </p:nvSpPr>
+        <p:spPr/>
+      </p:sp>
+      <p:sp>
+        <p:nvSpPr>
+          <p:cNvPr id="3" name="备注占位符 2"/>
+          <p:cNvSpPr>
+            <a:spLocks noGrp="1"/>
+          </p:cNvSpPr>
+          <p:nvPr>
+            <p:ph type="body" idx="1"/>
+          </p:nvPr>
+        </p:nvSpPr>
+        <p:spPr/>
+        <p:txBody>
+          <a:bodyPr/>
+          <a:lstStyle/>
+          <a:p>
+            <a:endParaRPr lang="zh-CN" altLang="en-US" dirty="0"/>
+          </a:p>
+        </p:txBody>
+      </p:sp>
+      <p:sp>
+        <p:nvSpPr>
+          <p:cNvPr id="4" name="灯片编号占位符 3"/>
+          <p:cNvSpPr>
+            <a:spLocks noGrp="1"/>
+          </p:cNvSpPr>
+          <p:nvPr>
+            <p:ph type="sldNum" sz="quarter" idx="5"/>
+          </p:nvPr>
+        </p:nvSpPr>
+        <p:spPr/>
+        <p:txBody>
+          <a:bodyPr/>
+          <a:lstStyle/>
+          <a:p>
+            <a:fld id="{C676D08B-1E4C-4901-ABEC-209650D3181D}" type="slidenum">
+              <a:rPr lang="zh-CN" altLang="en-US" smtClean="0"/>
+              <a:t>32</a:t>
+            </a:fld>
+            <a:endParaRPr lang="zh-CN" altLang="en-US"/>
+          </a:p>
+        </p:txBody>
+      </p:sp>
+    </p:spTree>
+    <p:extLst>
+      <p:ext uri="{BB962C8B-B14F-4D97-AF65-F5344CB8AC3E}">
+        <p14:creationId xmlns:p14="http://schemas.microsoft.com/office/powerpoint/2010/main" val="3360366944"/>
+      </p:ext>
+    </p:extLst>
+  </p:cSld>
+  <p:clrMapOvr>
+    <a:masterClrMapping/>
+  </p:clrMapOvr>
+</p:notes>
+</file>
+
 <file path=ppt/notesSlides/notesSlide2.xml><?xml version="1.0" encoding="utf-8"?>
 <p:notes xmlns:a="http://schemas.openxmlformats.org/drawingml/2006/main" xmlns:r="http://schemas.openxmlformats.org/officeDocument/2006/relationships" xmlns:p="http://schemas.openxmlformats.org/presentationml/2006/main">
   <p:cSld>
@@ -1822,7 +1906,7 @@
           <a:p>
             <a:fld id="{B9614994-C529-43AC-BD2C-52D47B0301A5}" type="datetimeFigureOut">
               <a:rPr lang="zh-CN" altLang="en-US" smtClean="0"/>
-              <a:t>2018/10/30</a:t>
+              <a:t>2018/10/31</a:t>
             </a:fld>
             <a:endParaRPr lang="zh-CN" altLang="en-US"/>
           </a:p>
@@ -2020,7 +2104,7 @@
           <a:p>
             <a:fld id="{B9614994-C529-43AC-BD2C-52D47B0301A5}" type="datetimeFigureOut">
               <a:rPr lang="zh-CN" altLang="en-US" smtClean="0"/>
-              <a:t>2018/10/30</a:t>
+              <a:t>2018/10/31</a:t>
             </a:fld>
             <a:endParaRPr lang="zh-CN" altLang="en-US"/>
           </a:p>
@@ -2228,7 +2312,7 @@
           <a:p>
             <a:fld id="{B9614994-C529-43AC-BD2C-52D47B0301A5}" type="datetimeFigureOut">
               <a:rPr lang="zh-CN" altLang="en-US" smtClean="0"/>
-              <a:t>2018/10/30</a:t>
+              <a:t>2018/10/31</a:t>
             </a:fld>
             <a:endParaRPr lang="zh-CN" altLang="en-US"/>
           </a:p>
@@ -2426,7 +2510,7 @@
           <a:p>
             <a:fld id="{B9614994-C529-43AC-BD2C-52D47B0301A5}" type="datetimeFigureOut">
               <a:rPr lang="zh-CN" altLang="en-US" smtClean="0"/>
-              <a:t>2018/10/30</a:t>
+              <a:t>2018/10/31</a:t>
             </a:fld>
             <a:endParaRPr lang="zh-CN" altLang="en-US"/>
           </a:p>
@@ -2701,7 +2785,7 @@
           <a:p>
             <a:fld id="{B9614994-C529-43AC-BD2C-52D47B0301A5}" type="datetimeFigureOut">
               <a:rPr lang="zh-CN" altLang="en-US" smtClean="0"/>
-              <a:t>2018/10/30</a:t>
+              <a:t>2018/10/31</a:t>
             </a:fld>
             <a:endParaRPr lang="zh-CN" altLang="en-US"/>
           </a:p>
@@ -2966,7 +3050,7 @@
           <a:p>
             <a:fld id="{B9614994-C529-43AC-BD2C-52D47B0301A5}" type="datetimeFigureOut">
               <a:rPr lang="zh-CN" altLang="en-US" smtClean="0"/>
-              <a:t>2018/10/30</a:t>
+              <a:t>2018/10/31</a:t>
             </a:fld>
             <a:endParaRPr lang="zh-CN" altLang="en-US"/>
           </a:p>
@@ -3378,7 +3462,7 @@
           <a:p>
             <a:fld id="{B9614994-C529-43AC-BD2C-52D47B0301A5}" type="datetimeFigureOut">
               <a:rPr lang="zh-CN" altLang="en-US" smtClean="0"/>
-              <a:t>2018/10/30</a:t>
+              <a:t>2018/10/31</a:t>
             </a:fld>
             <a:endParaRPr lang="zh-CN" altLang="en-US"/>
           </a:p>
@@ -3519,7 +3603,7 @@
           <a:p>
             <a:fld id="{B9614994-C529-43AC-BD2C-52D47B0301A5}" type="datetimeFigureOut">
               <a:rPr lang="zh-CN" altLang="en-US" smtClean="0"/>
-              <a:t>2018/10/30</a:t>
+              <a:t>2018/10/31</a:t>
             </a:fld>
             <a:endParaRPr lang="zh-CN" altLang="en-US"/>
           </a:p>
@@ -3632,7 +3716,7 @@
           <a:p>
             <a:fld id="{B9614994-C529-43AC-BD2C-52D47B0301A5}" type="datetimeFigureOut">
               <a:rPr lang="zh-CN" altLang="en-US" smtClean="0"/>
-              <a:t>2018/10/30</a:t>
+              <a:t>2018/10/31</a:t>
             </a:fld>
             <a:endParaRPr lang="zh-CN" altLang="en-US"/>
           </a:p>
@@ -3943,7 +4027,7 @@
           <a:p>
             <a:fld id="{B9614994-C529-43AC-BD2C-52D47B0301A5}" type="datetimeFigureOut">
               <a:rPr lang="zh-CN" altLang="en-US" smtClean="0"/>
-              <a:t>2018/10/30</a:t>
+              <a:t>2018/10/31</a:t>
             </a:fld>
             <a:endParaRPr lang="zh-CN" altLang="en-US"/>
           </a:p>
@@ -4231,7 +4315,7 @@
           <a:p>
             <a:fld id="{B9614994-C529-43AC-BD2C-52D47B0301A5}" type="datetimeFigureOut">
               <a:rPr lang="zh-CN" altLang="en-US" smtClean="0"/>
-              <a:t>2018/10/30</a:t>
+              <a:t>2018/10/31</a:t>
             </a:fld>
             <a:endParaRPr lang="zh-CN" altLang="en-US"/>
           </a:p>
@@ -4472,7 +4556,7 @@
           <a:p>
             <a:fld id="{B9614994-C529-43AC-BD2C-52D47B0301A5}" type="datetimeFigureOut">
               <a:rPr lang="zh-CN" altLang="en-US" smtClean="0"/>
-              <a:t>2018/10/30</a:t>
+              <a:t>2018/10/31</a:t>
             </a:fld>
             <a:endParaRPr lang="zh-CN" altLang="en-US"/>
           </a:p>
@@ -7217,15 +7301,16 @@
           </a:p>
           <a:p>
             <a:r>
-              <a:rPr lang="en-US" altLang="zh-CN" dirty="0"/>
+              <a:rPr lang="en-US" altLang="zh-CN"/>
               <a:t>Codec Conversion</a:t>
             </a:r>
           </a:p>
           <a:p>
             <a:r>
-              <a:rPr lang="en-US" altLang="zh-CN" dirty="0"/>
+              <a:rPr lang="en-US" altLang="zh-CN"/>
               <a:t>Milestones</a:t>
             </a:r>
+            <a:endParaRPr lang="en-US" altLang="zh-CN" dirty="0"/>
           </a:p>
           <a:p>
             <a:endParaRPr lang="en-US" altLang="zh-CN" dirty="0"/>
@@ -9575,6 +9660,13 @@
             </a:r>
           </a:p>
           <a:p>
+            <a:pPr lvl="2"/>
+            <a:r>
+              <a:rPr lang="en-US" altLang="zh-CN" dirty="0"/>
+              <a:t>Growing Memory cell</a:t>
+            </a:r>
+          </a:p>
+          <a:p>
             <a:pPr lvl="1"/>
             <a:r>
               <a:rPr lang="en-US" altLang="zh-CN" dirty="0">
@@ -9743,7 +9835,7 @@
         <p:spPr/>
         <p:txBody>
           <a:bodyPr>
-            <a:normAutofit fontScale="92500" lnSpcReduction="20000"/>
+            <a:normAutofit fontScale="85000" lnSpcReduction="20000"/>
           </a:bodyPr>
           <a:lstStyle/>
           <a:p>
@@ -9760,6 +9852,17 @@
                   <a:srgbClr val="FF0000"/>
                 </a:solidFill>
               </a:rPr>
+              <a:t>Experiment better classification performance</a:t>
+            </a:r>
+          </a:p>
+          <a:p>
+            <a:pPr lvl="1"/>
+            <a:r>
+              <a:rPr lang="en-US" altLang="zh-CN" dirty="0">
+                <a:solidFill>
+                  <a:srgbClr val="FF0000"/>
+                </a:solidFill>
+              </a:rPr>
               <a:t>Test on ImageNet and Coco Dataset after memory issue fixed</a:t>
             </a:r>
           </a:p>
@@ -9773,7 +9876,11 @@
           <a:p>
             <a:pPr lvl="1"/>
             <a:r>
-              <a:rPr lang="en-US" altLang="zh-CN" dirty="0"/>
+              <a:rPr lang="en-US" altLang="zh-CN" dirty="0">
+                <a:solidFill>
+                  <a:srgbClr val="FFC000"/>
+                </a:solidFill>
+              </a:rPr>
               <a:t>Test with large image shape with deeper models with ImageNet</a:t>
             </a:r>
           </a:p>
@@ -9820,14 +9927,22 @@
           <a:p>
             <a:pPr lvl="1"/>
             <a:r>
-              <a:rPr lang="en-US" altLang="zh-CN" dirty="0"/>
+              <a:rPr lang="en-US" altLang="zh-CN" dirty="0">
+                <a:solidFill>
+                  <a:srgbClr val="FFC000"/>
+                </a:solidFill>
+              </a:rPr>
               <a:t>Test more multi-scale model</a:t>
             </a:r>
           </a:p>
           <a:p>
             <a:pPr lvl="1"/>
             <a:r>
-              <a:rPr lang="en-US" altLang="zh-CN" dirty="0"/>
+              <a:rPr lang="en-US" altLang="zh-CN" dirty="0">
+                <a:solidFill>
+                  <a:srgbClr val="FF0000"/>
+                </a:solidFill>
+              </a:rPr>
               <a:t>Test distributed codecs with smaller encoders</a:t>
             </a:r>
           </a:p>
@@ -9839,14 +9954,7 @@
                   <a:srgbClr val="FF0000"/>
                 </a:solidFill>
               </a:rPr>
-              <a:t>Test distributed codecs with isolated encoders and decoders</a:t>
-            </a:r>
-          </a:p>
-          <a:p>
-            <a:pPr lvl="1"/>
-            <a:r>
-              <a:rPr lang="en-US" altLang="zh-CN" dirty="0"/>
-              <a:t>Test distributed codecs with designed experiment (asynchronous?)</a:t>
+              <a:t>Test decoders for different number of nodes</a:t>
             </a:r>
           </a:p>
           <a:p>
@@ -9855,6 +9963,28 @@
               <a:rPr lang="en-US" altLang="zh-CN" dirty="0">
                 <a:solidFill>
                   <a:srgbClr val="FF0000"/>
+                </a:solidFill>
+              </a:rPr>
+              <a:t>Experiment smaller gap among the number of nodes</a:t>
+            </a:r>
+          </a:p>
+          <a:p>
+            <a:pPr lvl="1"/>
+            <a:r>
+              <a:rPr lang="en-US" altLang="zh-CN" dirty="0">
+                <a:solidFill>
+                  <a:srgbClr val="FF0000"/>
+                </a:solidFill>
+              </a:rPr>
+              <a:t>Experiment images from different angle for distributed systems</a:t>
+            </a:r>
+          </a:p>
+          <a:p>
+            <a:pPr lvl="1"/>
+            <a:r>
+              <a:rPr lang="en-US" altLang="zh-CN" dirty="0">
+                <a:solidFill>
+                  <a:srgbClr val="FFC000"/>
                 </a:solidFill>
               </a:rPr>
               <a:t>Start Video Compression</a:t>

</xml_diff>